<commit_message>
révision  syllabus 24 25 26
</commit_message>
<xml_diff>
--- a/syllabus/25_intégration_XML/syllabus_25_xml.pptx
+++ b/syllabus/25_intégration_XML/syllabus_25_xml.pptx
@@ -308,7 +308,7 @@
           <a:p>
             <a:fld id="{FCE9742F-4DAE-47F5-9244-6ACC3985DD6B}" type="datetimeFigureOut">
               <a:rPr lang="fr-BE" smtClean="0"/>
-              <a:t>13-11-23</a:t>
+              <a:t>23-10-24</a:t>
             </a:fld>
             <a:endParaRPr lang="fr-BE"/>
           </a:p>
@@ -14646,7 +14646,11 @@
               <a:buNone/>
             </a:pPr>
             <a:r>
-              <a:rPr lang="fr-BE" sz="2400"/>
+              <a:rPr lang="fr-BE" sz="2400">
+                <a:solidFill>
+                  <a:schemeClr val="accent2"/>
+                </a:solidFill>
+              </a:rPr>
               <a:t>25. Données XML</a:t>
             </a:r>
           </a:p>
@@ -14678,7 +14682,7 @@
         <p14:reveal/>
       </p:transition>
     </mc:Choice>
-    <mc:Fallback xmlns:ahyp="http://schemas.microsoft.com/office/drawing/2018/hyperlinkcolor" xmlns:p15="http://schemas.microsoft.com/office/powerpoint/2012/main" xmlns:com="http://schemas.openxmlformats.org/drawingml/2006/compatibility" xmlns:pvml="urn:schemas-microsoft-com:office:powerpoint" xmlns:v="urn:schemas-microsoft-com:vml" xmlns:o="urn:schemas-microsoft-com:office:office" xmlns:dgm="http://schemas.openxmlformats.org/drawingml/2006/diagram" xmlns:c="http://schemas.openxmlformats.org/drawingml/2006/chart" xmlns:mv="urn:schemas-microsoft-com:mac:vml" xmlns="">
+    <mc:Fallback xmlns="" xmlns:mv="urn:schemas-microsoft-com:mac:vml" xmlns:c="http://schemas.openxmlformats.org/drawingml/2006/chart" xmlns:dgm="http://schemas.openxmlformats.org/drawingml/2006/diagram" xmlns:o="urn:schemas-microsoft-com:office:office" xmlns:v="urn:schemas-microsoft-com:vml" xmlns:pvml="urn:schemas-microsoft-com:office:powerpoint" xmlns:com="http://schemas.openxmlformats.org/drawingml/2006/compatibility" xmlns:p15="http://schemas.microsoft.com/office/powerpoint/2012/main" xmlns:ahyp="http://schemas.microsoft.com/office/drawing/2018/hyperlinkcolor">
       <p:transition spd="med">
         <p:fade/>
       </p:transition>

</xml_diff>